<commit_message>
Update dashboard class diagram
</commit_message>
<xml_diff>
--- a/docs/diagrams/ModelComponentDashboardClassDiagram.pptx
+++ b/docs/diagrams/ModelComponentDashboardClassDiagram.pptx
@@ -261,7 +261,7 @@
           <a:p>
             <a:fld id="{73C35D20-845F-4F09-9797-1401D251B6EB}" type="datetimeFigureOut">
               <a:rPr lang="en-SG" smtClean="0"/>
-              <a:t>3/4/2018</a:t>
+              <a:t>13/4/2018</a:t>
             </a:fld>
             <a:endParaRPr lang="en-SG"/>
           </a:p>
@@ -461,7 +461,7 @@
           <a:p>
             <a:fld id="{73C35D20-845F-4F09-9797-1401D251B6EB}" type="datetimeFigureOut">
               <a:rPr lang="en-SG" smtClean="0"/>
-              <a:t>3/4/2018</a:t>
+              <a:t>13/4/2018</a:t>
             </a:fld>
             <a:endParaRPr lang="en-SG"/>
           </a:p>
@@ -671,7 +671,7 @@
           <a:p>
             <a:fld id="{73C35D20-845F-4F09-9797-1401D251B6EB}" type="datetimeFigureOut">
               <a:rPr lang="en-SG" smtClean="0"/>
-              <a:t>3/4/2018</a:t>
+              <a:t>13/4/2018</a:t>
             </a:fld>
             <a:endParaRPr lang="en-SG"/>
           </a:p>
@@ -871,7 +871,7 @@
           <a:p>
             <a:fld id="{73C35D20-845F-4F09-9797-1401D251B6EB}" type="datetimeFigureOut">
               <a:rPr lang="en-SG" smtClean="0"/>
-              <a:t>3/4/2018</a:t>
+              <a:t>13/4/2018</a:t>
             </a:fld>
             <a:endParaRPr lang="en-SG"/>
           </a:p>
@@ -1147,7 +1147,7 @@
           <a:p>
             <a:fld id="{73C35D20-845F-4F09-9797-1401D251B6EB}" type="datetimeFigureOut">
               <a:rPr lang="en-SG" smtClean="0"/>
-              <a:t>3/4/2018</a:t>
+              <a:t>13/4/2018</a:t>
             </a:fld>
             <a:endParaRPr lang="en-SG"/>
           </a:p>
@@ -1415,7 +1415,7 @@
           <a:p>
             <a:fld id="{73C35D20-845F-4F09-9797-1401D251B6EB}" type="datetimeFigureOut">
               <a:rPr lang="en-SG" smtClean="0"/>
-              <a:t>3/4/2018</a:t>
+              <a:t>13/4/2018</a:t>
             </a:fld>
             <a:endParaRPr lang="en-SG"/>
           </a:p>
@@ -1830,7 +1830,7 @@
           <a:p>
             <a:fld id="{73C35D20-845F-4F09-9797-1401D251B6EB}" type="datetimeFigureOut">
               <a:rPr lang="en-SG" smtClean="0"/>
-              <a:t>3/4/2018</a:t>
+              <a:t>13/4/2018</a:t>
             </a:fld>
             <a:endParaRPr lang="en-SG"/>
           </a:p>
@@ -1972,7 +1972,7 @@
           <a:p>
             <a:fld id="{73C35D20-845F-4F09-9797-1401D251B6EB}" type="datetimeFigureOut">
               <a:rPr lang="en-SG" smtClean="0"/>
-              <a:t>3/4/2018</a:t>
+              <a:t>13/4/2018</a:t>
             </a:fld>
             <a:endParaRPr lang="en-SG"/>
           </a:p>
@@ -2085,7 +2085,7 @@
           <a:p>
             <a:fld id="{73C35D20-845F-4F09-9797-1401D251B6EB}" type="datetimeFigureOut">
               <a:rPr lang="en-SG" smtClean="0"/>
-              <a:t>3/4/2018</a:t>
+              <a:t>13/4/2018</a:t>
             </a:fld>
             <a:endParaRPr lang="en-SG"/>
           </a:p>
@@ -2398,7 +2398,7 @@
           <a:p>
             <a:fld id="{73C35D20-845F-4F09-9797-1401D251B6EB}" type="datetimeFigureOut">
               <a:rPr lang="en-SG" smtClean="0"/>
-              <a:t>3/4/2018</a:t>
+              <a:t>13/4/2018</a:t>
             </a:fld>
             <a:endParaRPr lang="en-SG"/>
           </a:p>
@@ -2687,7 +2687,7 @@
           <a:p>
             <a:fld id="{73C35D20-845F-4F09-9797-1401D251B6EB}" type="datetimeFigureOut">
               <a:rPr lang="en-SG" smtClean="0"/>
-              <a:t>3/4/2018</a:t>
+              <a:t>13/4/2018</a:t>
             </a:fld>
             <a:endParaRPr lang="en-SG"/>
           </a:p>
@@ -2930,7 +2930,7 @@
           <a:p>
             <a:fld id="{73C35D20-845F-4F09-9797-1401D251B6EB}" type="datetimeFigureOut">
               <a:rPr lang="en-SG" smtClean="0"/>
-              <a:t>3/4/2018</a:t>
+              <a:t>13/4/2018</a:t>
             </a:fld>
             <a:endParaRPr lang="en-SG"/>
           </a:p>
@@ -3361,8 +3361,8 @@
         </p:nvSpPr>
         <p:spPr>
           <a:xfrm>
-            <a:off x="2906888" y="1063097"/>
-            <a:ext cx="5943601" cy="4149500"/>
+            <a:off x="2251698" y="999339"/>
+            <a:ext cx="7502807" cy="5590842"/>
           </a:xfrm>
           <a:prstGeom prst="roundRect">
             <a:avLst>
@@ -3450,8 +3450,8 @@
         </p:nvSpPr>
         <p:spPr>
           <a:xfrm>
-            <a:off x="4971745" y="1328113"/>
-            <a:ext cx="1541395" cy="355965"/>
+            <a:off x="4996358" y="1341147"/>
+            <a:ext cx="1945755" cy="479611"/>
           </a:xfrm>
           <a:prstGeom prst="rect">
             <a:avLst/>
@@ -3556,8 +3556,8 @@
         </p:nvSpPr>
         <p:spPr>
           <a:xfrm>
-            <a:off x="5624419" y="1696747"/>
-            <a:ext cx="236048" cy="155722"/>
+            <a:off x="5823427" y="1835602"/>
+            <a:ext cx="297972" cy="209813"/>
           </a:xfrm>
           <a:prstGeom prst="flowChartDecision">
             <a:avLst/>
@@ -3594,7 +3594,7 @@
               <a:tabLst/>
               <a:defRPr/>
             </a:pPr>
-            <a:endParaRPr kumimoji="0" lang="en-US" sz="1050" b="0" i="0" u="none" strike="noStrike" kern="0" cap="none" spc="0" normalizeH="0" baseline="0" noProof="0">
+            <a:endParaRPr kumimoji="0" lang="en-US" sz="1050" b="0" i="0" u="none" strike="noStrike" kern="0" cap="none" spc="0" normalizeH="0" baseline="0" noProof="0" dirty="0">
               <a:ln>
                 <a:noFill/>
               </a:ln>
@@ -3628,8 +3628,8 @@
         </p:nvCxnSpPr>
         <p:spPr>
           <a:xfrm rot="16200000" flipH="1">
-            <a:off x="5587547" y="2007365"/>
-            <a:ext cx="309794" cy="2"/>
+            <a:off x="5842435" y="2175392"/>
+            <a:ext cx="259957" cy="1"/>
           </a:xfrm>
           <a:prstGeom prst="bentConnector3">
             <a:avLst>
@@ -3662,10 +3662,10 @@
       </p:cxnSp>
       <p:sp>
         <p:nvSpPr>
-          <p:cNvPr id="13" name="Rectangle 8">
-            <a:extLst>
-              <a:ext uri="{FF2B5EF4-FFF2-40B4-BE49-F238E27FC236}">
-                <a16:creationId xmlns:a16="http://schemas.microsoft.com/office/drawing/2014/main" id="{7A153241-7F74-4F60-92F5-69ACB929F9E3}"/>
+          <p:cNvPr id="14" name="Flowchart: Decision 96">
+            <a:extLst>
+              <a:ext uri="{FF2B5EF4-FFF2-40B4-BE49-F238E27FC236}">
+                <a16:creationId xmlns:a16="http://schemas.microsoft.com/office/drawing/2014/main" id="{3CCDC9A0-BE8C-4ACD-977B-A5862CF1E203}"/>
               </a:ext>
             </a:extLst>
           </p:cNvPr>
@@ -3674,8 +3674,107 @@
         </p:nvSpPr>
         <p:spPr>
           <a:xfrm>
-            <a:off x="4978097" y="2162263"/>
-            <a:ext cx="1541395" cy="355965"/>
+            <a:off x="5626387" y="2535780"/>
+            <a:ext cx="297972" cy="209813"/>
+          </a:xfrm>
+          <a:prstGeom prst="flowChartDecision">
+            <a:avLst/>
+          </a:prstGeom>
+          <a:noFill/>
+          <a:ln w="19050">
+            <a:solidFill>
+              <a:srgbClr val="7030A0"/>
+            </a:solidFill>
+          </a:ln>
+          <a:effectLst/>
+        </p:spPr>
+        <p:style>
+          <a:lnRef idx="1">
+            <a:schemeClr val="accent6"/>
+          </a:lnRef>
+          <a:fillRef idx="2">
+            <a:schemeClr val="accent6"/>
+          </a:fillRef>
+          <a:effectRef idx="1">
+            <a:schemeClr val="accent6"/>
+          </a:effectRef>
+          <a:fontRef idx="minor">
+            <a:schemeClr val="dk1"/>
+          </a:fontRef>
+        </p:style>
+        <p:txBody>
+          <a:bodyPr rtlCol="0" anchor="ctr"/>
+          <a:lstStyle/>
+          <a:p>
+            <a:pPr algn="ctr"/>
+            <a:endParaRPr lang="en-US" sz="1050"/>
+          </a:p>
+        </p:txBody>
+      </p:sp>
+      <p:cxnSp>
+        <p:nvCxnSpPr>
+          <p:cNvPr id="37" name="Elbow Connector 63">
+            <a:extLst>
+              <a:ext uri="{FF2B5EF4-FFF2-40B4-BE49-F238E27FC236}">
+                <a16:creationId xmlns:a16="http://schemas.microsoft.com/office/drawing/2014/main" id="{D5595761-9107-4145-B966-CA1AF81F4A3D}"/>
+              </a:ext>
+            </a:extLst>
+          </p:cNvPr>
+          <p:cNvCxnSpPr>
+            <a:cxnSpLocks/>
+          </p:cNvCxnSpPr>
+          <p:nvPr/>
+        </p:nvCxnSpPr>
+        <p:spPr>
+          <a:xfrm rot="16200000" flipH="1">
+            <a:off x="5772139" y="3229847"/>
+            <a:ext cx="393610" cy="2"/>
+          </a:xfrm>
+          <a:prstGeom prst="bentConnector3">
+            <a:avLst>
+              <a:gd name="adj1" fmla="val 22037"/>
+            </a:avLst>
+          </a:prstGeom>
+          <a:ln w="19050">
+            <a:solidFill>
+              <a:srgbClr val="7030A0"/>
+            </a:solidFill>
+            <a:headEnd type="none" w="med" len="med"/>
+            <a:tailEnd type="arrow" w="med" len="med"/>
+          </a:ln>
+          <a:effectLst/>
+        </p:spPr>
+        <p:style>
+          <a:lnRef idx="1">
+            <a:schemeClr val="accent2"/>
+          </a:lnRef>
+          <a:fillRef idx="2">
+            <a:schemeClr val="accent2"/>
+          </a:fillRef>
+          <a:effectRef idx="1">
+            <a:schemeClr val="accent2"/>
+          </a:effectRef>
+          <a:fontRef idx="minor">
+            <a:schemeClr val="dk1"/>
+          </a:fontRef>
+        </p:style>
+      </p:cxnSp>
+      <p:sp>
+        <p:nvSpPr>
+          <p:cNvPr id="38" name="Rectangle 8">
+            <a:extLst>
+              <a:ext uri="{FF2B5EF4-FFF2-40B4-BE49-F238E27FC236}">
+                <a16:creationId xmlns:a16="http://schemas.microsoft.com/office/drawing/2014/main" id="{A6EFA88D-A67F-430D-B7C9-84E639D8EAD5}"/>
+              </a:ext>
+            </a:extLst>
+          </p:cNvPr>
+          <p:cNvSpPr/>
+          <p:nvPr/>
+        </p:nvSpPr>
+        <p:spPr>
+          <a:xfrm>
+            <a:off x="4996359" y="3428524"/>
+            <a:ext cx="1945755" cy="479611"/>
           </a:xfrm>
           <a:prstGeom prst="rect">
             <a:avLst/>
@@ -3733,7 +3832,7 @@
               <a:defRPr/>
             </a:pPr>
             <a:r>
-              <a:rPr kumimoji="0" lang="en-US" sz="1050" b="0" i="0" u="none" strike="noStrike" kern="0" cap="none" spc="0" normalizeH="0" baseline="0" noProof="0" dirty="0" err="1">
+              <a:rPr kumimoji="0" lang="en-US" sz="1050" b="0" i="0" u="none" strike="noStrike" kern="0" cap="none" spc="0" normalizeH="0" baseline="0" noProof="0" dirty="0">
                 <a:ln>
                   <a:noFill/>
                 </a:ln>
@@ -3747,7 +3846,7 @@
                 <a:ea typeface="+mn-ea"/>
                 <a:cs typeface="+mn-cs"/>
               </a:rPr>
-              <a:t>UniqueMilestoneList</a:t>
+              <a:t>Milestone</a:t>
             </a:r>
             <a:endParaRPr kumimoji="0" lang="en-SG" sz="1050" b="0" i="0" u="none" strike="noStrike" kern="0" cap="none" spc="0" normalizeH="0" baseline="0" noProof="0" dirty="0">
               <a:ln>
@@ -3768,10 +3867,10 @@
       </p:sp>
       <p:sp>
         <p:nvSpPr>
-          <p:cNvPr id="14" name="Flowchart: Decision 96">
-            <a:extLst>
-              <a:ext uri="{FF2B5EF4-FFF2-40B4-BE49-F238E27FC236}">
-                <a16:creationId xmlns:a16="http://schemas.microsoft.com/office/drawing/2014/main" id="{3CCDC9A0-BE8C-4ACD-977B-A5862CF1E203}"/>
+          <p:cNvPr id="39" name="Flowchart: Decision 96">
+            <a:extLst>
+              <a:ext uri="{FF2B5EF4-FFF2-40B4-BE49-F238E27FC236}">
+                <a16:creationId xmlns:a16="http://schemas.microsoft.com/office/drawing/2014/main" id="{F23C8D9B-229E-4405-A382-B0389E0FD2B4}"/>
               </a:ext>
             </a:extLst>
           </p:cNvPr>
@@ -3780,97 +3879,67 @@
         </p:nvSpPr>
         <p:spPr>
           <a:xfrm>
-            <a:off x="5626387" y="2535781"/>
-            <a:ext cx="236048" cy="155722"/>
+            <a:off x="5807387" y="3927383"/>
+            <a:ext cx="297972" cy="209813"/>
           </a:xfrm>
           <a:prstGeom prst="flowChartDecision">
             <a:avLst/>
           </a:prstGeom>
-          <a:noFill/>
-          <a:ln w="19050">
+          <a:solidFill>
+            <a:srgbClr val="7030A0"/>
+          </a:solidFill>
+          <a:ln w="19050" cap="flat" cmpd="sng" algn="ctr">
             <a:solidFill>
               <a:srgbClr val="7030A0"/>
             </a:solidFill>
+            <a:prstDash val="solid"/>
           </a:ln>
           <a:effectLst/>
         </p:spPr>
-        <p:style>
-          <a:lnRef idx="1">
-            <a:schemeClr val="accent6"/>
-          </a:lnRef>
-          <a:fillRef idx="2">
-            <a:schemeClr val="accent6"/>
-          </a:fillRef>
-          <a:effectRef idx="1">
-            <a:schemeClr val="accent6"/>
-          </a:effectRef>
-          <a:fontRef idx="minor">
-            <a:schemeClr val="dk1"/>
-          </a:fontRef>
-        </p:style>
         <p:txBody>
           <a:bodyPr rtlCol="0" anchor="ctr"/>
           <a:lstStyle/>
           <a:p>
-            <a:pPr algn="ctr"/>
-            <a:endParaRPr lang="en-US" sz="1050"/>
-          </a:p>
-        </p:txBody>
-      </p:sp>
-      <p:cxnSp>
-        <p:nvCxnSpPr>
-          <p:cNvPr id="37" name="Elbow Connector 63">
-            <a:extLst>
-              <a:ext uri="{FF2B5EF4-FFF2-40B4-BE49-F238E27FC236}">
-                <a16:creationId xmlns:a16="http://schemas.microsoft.com/office/drawing/2014/main" id="{D5595761-9107-4145-B966-CA1AF81F4A3D}"/>
-              </a:ext>
-            </a:extLst>
-          </p:cNvPr>
-          <p:cNvCxnSpPr>
-            <a:cxnSpLocks/>
-          </p:cNvCxnSpPr>
-          <p:nvPr/>
-        </p:nvCxnSpPr>
-        <p:spPr>
-          <a:xfrm rot="16200000" flipH="1">
-            <a:off x="5596375" y="2837570"/>
-            <a:ext cx="292136" cy="2"/>
-          </a:xfrm>
-          <a:prstGeom prst="bentConnector3">
-            <a:avLst>
-              <a:gd name="adj1" fmla="val 50000"/>
-            </a:avLst>
-          </a:prstGeom>
-          <a:ln w="19050">
-            <a:solidFill>
-              <a:srgbClr val="7030A0"/>
-            </a:solidFill>
-            <a:headEnd type="none" w="med" len="med"/>
-            <a:tailEnd type="arrow" w="med" len="med"/>
-          </a:ln>
-          <a:effectLst/>
-        </p:spPr>
-        <p:style>
-          <a:lnRef idx="1">
-            <a:schemeClr val="accent2"/>
-          </a:lnRef>
-          <a:fillRef idx="2">
-            <a:schemeClr val="accent2"/>
-          </a:fillRef>
-          <a:effectRef idx="1">
-            <a:schemeClr val="accent2"/>
-          </a:effectRef>
-          <a:fontRef idx="minor">
-            <a:schemeClr val="dk1"/>
-          </a:fontRef>
-        </p:style>
-      </p:cxnSp>
-      <p:sp>
-        <p:nvSpPr>
-          <p:cNvPr id="38" name="Rectangle 8">
-            <a:extLst>
-              <a:ext uri="{FF2B5EF4-FFF2-40B4-BE49-F238E27FC236}">
-                <a16:creationId xmlns:a16="http://schemas.microsoft.com/office/drawing/2014/main" id="{A6EFA88D-A67F-430D-B7C9-84E639D8EAD5}"/>
+            <a:pPr marL="0" marR="0" lvl="0" indent="0" algn="ctr" defTabSz="914400" eaLnBrk="1" fontAlgn="auto" latinLnBrk="0" hangingPunct="1">
+              <a:lnSpc>
+                <a:spcPct val="100000"/>
+              </a:lnSpc>
+              <a:spcBef>
+                <a:spcPts val="0"/>
+              </a:spcBef>
+              <a:spcAft>
+                <a:spcPts val="0"/>
+              </a:spcAft>
+              <a:buClrTx/>
+              <a:buSzTx/>
+              <a:buFontTx/>
+              <a:buNone/>
+              <a:tabLst/>
+              <a:defRPr/>
+            </a:pPr>
+            <a:endParaRPr kumimoji="0" lang="en-US" sz="1050" b="0" i="0" u="none" strike="noStrike" kern="0" cap="none" spc="0" normalizeH="0" baseline="0" noProof="0">
+              <a:ln>
+                <a:noFill/>
+              </a:ln>
+              <a:solidFill>
+                <a:prstClr val="black"/>
+              </a:solidFill>
+              <a:effectLst/>
+              <a:uLnTx/>
+              <a:uFillTx/>
+              <a:latin typeface="Calibri"/>
+              <a:ea typeface="+mn-ea"/>
+              <a:cs typeface="+mn-cs"/>
+            </a:endParaRPr>
+          </a:p>
+        </p:txBody>
+      </p:sp>
+      <p:sp>
+        <p:nvSpPr>
+          <p:cNvPr id="40" name="Rectangle 8">
+            <a:extLst>
+              <a:ext uri="{FF2B5EF4-FFF2-40B4-BE49-F238E27FC236}">
+                <a16:creationId xmlns:a16="http://schemas.microsoft.com/office/drawing/2014/main" id="{BC57C3C7-AF99-45BC-B50C-BA55937B2BAB}"/>
               </a:ext>
             </a:extLst>
           </p:cNvPr>
@@ -3879,8 +3948,8 @@
         </p:nvSpPr>
         <p:spPr>
           <a:xfrm>
-            <a:off x="4971745" y="2998812"/>
-            <a:ext cx="1541395" cy="355965"/>
+            <a:off x="2771796" y="4927392"/>
+            <a:ext cx="1945755" cy="479611"/>
           </a:xfrm>
           <a:prstGeom prst="rect">
             <a:avLst/>
@@ -3952,7 +4021,7 @@
                 <a:ea typeface="+mn-ea"/>
                 <a:cs typeface="+mn-cs"/>
               </a:rPr>
-              <a:t>Milestone</a:t>
+              <a:t>Date</a:t>
             </a:r>
             <a:endParaRPr kumimoji="0" lang="en-SG" sz="1050" b="0" i="0" u="none" strike="noStrike" kern="0" cap="none" spc="0" normalizeH="0" baseline="0" noProof="0" dirty="0">
               <a:ln>
@@ -3973,10 +4042,10 @@
       </p:sp>
       <p:sp>
         <p:nvSpPr>
-          <p:cNvPr id="39" name="Flowchart: Decision 96">
-            <a:extLst>
-              <a:ext uri="{FF2B5EF4-FFF2-40B4-BE49-F238E27FC236}">
-                <a16:creationId xmlns:a16="http://schemas.microsoft.com/office/drawing/2014/main" id="{F23C8D9B-229E-4405-A382-B0389E0FD2B4}"/>
+          <p:cNvPr id="41" name="Rectangle 8">
+            <a:extLst>
+              <a:ext uri="{FF2B5EF4-FFF2-40B4-BE49-F238E27FC236}">
+                <a16:creationId xmlns:a16="http://schemas.microsoft.com/office/drawing/2014/main" id="{EBC10A51-6A0C-43FA-BC5C-F67781E2F5B6}"/>
               </a:ext>
             </a:extLst>
           </p:cNvPr>
@@ -3985,77 +4054,8 @@
         </p:nvSpPr>
         <p:spPr>
           <a:xfrm>
-            <a:off x="5630768" y="3367716"/>
-            <a:ext cx="236048" cy="155722"/>
-          </a:xfrm>
-          <a:prstGeom prst="flowChartDecision">
-            <a:avLst/>
-          </a:prstGeom>
-          <a:solidFill>
-            <a:srgbClr val="7030A0"/>
-          </a:solidFill>
-          <a:ln w="19050" cap="flat" cmpd="sng" algn="ctr">
-            <a:solidFill>
-              <a:srgbClr val="7030A0"/>
-            </a:solidFill>
-            <a:prstDash val="solid"/>
-          </a:ln>
-          <a:effectLst/>
-        </p:spPr>
-        <p:txBody>
-          <a:bodyPr rtlCol="0" anchor="ctr"/>
-          <a:lstStyle/>
-          <a:p>
-            <a:pPr marL="0" marR="0" lvl="0" indent="0" algn="ctr" defTabSz="914400" eaLnBrk="1" fontAlgn="auto" latinLnBrk="0" hangingPunct="1">
-              <a:lnSpc>
-                <a:spcPct val="100000"/>
-              </a:lnSpc>
-              <a:spcBef>
-                <a:spcPts val="0"/>
-              </a:spcBef>
-              <a:spcAft>
-                <a:spcPts val="0"/>
-              </a:spcAft>
-              <a:buClrTx/>
-              <a:buSzTx/>
-              <a:buFontTx/>
-              <a:buNone/>
-              <a:tabLst/>
-              <a:defRPr/>
-            </a:pPr>
-            <a:endParaRPr kumimoji="0" lang="en-US" sz="1050" b="0" i="0" u="none" strike="noStrike" kern="0" cap="none" spc="0" normalizeH="0" baseline="0" noProof="0">
-              <a:ln>
-                <a:noFill/>
-              </a:ln>
-              <a:solidFill>
-                <a:prstClr val="black"/>
-              </a:solidFill>
-              <a:effectLst/>
-              <a:uLnTx/>
-              <a:uFillTx/>
-              <a:latin typeface="Calibri"/>
-              <a:ea typeface="+mn-ea"/>
-              <a:cs typeface="+mn-cs"/>
-            </a:endParaRPr>
-          </a:p>
-        </p:txBody>
-      </p:sp>
-      <p:sp>
-        <p:nvSpPr>
-          <p:cNvPr id="40" name="Rectangle 8">
-            <a:extLst>
-              <a:ext uri="{FF2B5EF4-FFF2-40B4-BE49-F238E27FC236}">
-                <a16:creationId xmlns:a16="http://schemas.microsoft.com/office/drawing/2014/main" id="{BC57C3C7-AF99-45BC-B50C-BA55937B2BAB}"/>
-              </a:ext>
-            </a:extLst>
-          </p:cNvPr>
-          <p:cNvSpPr/>
-          <p:nvPr/>
-        </p:nvSpPr>
-        <p:spPr>
-          <a:xfrm>
-            <a:off x="3167203" y="3816645"/>
-            <a:ext cx="1541395" cy="355965"/>
+            <a:off x="4996358" y="4927393"/>
+            <a:ext cx="1945755" cy="479611"/>
           </a:xfrm>
           <a:prstGeom prst="rect">
             <a:avLst/>
@@ -4127,31 +4127,17 @@
                 <a:ea typeface="+mn-ea"/>
                 <a:cs typeface="+mn-cs"/>
               </a:rPr>
-              <a:t>Date</a:t>
-            </a:r>
-            <a:endParaRPr kumimoji="0" lang="en-SG" sz="1050" b="0" i="0" u="none" strike="noStrike" kern="0" cap="none" spc="0" normalizeH="0" baseline="0" noProof="0" dirty="0">
-              <a:ln>
-                <a:noFill/>
-              </a:ln>
-              <a:solidFill>
-                <a:srgbClr val="7030A0"/>
-              </a:solidFill>
-              <a:effectLst/>
-              <a:uLnTx/>
-              <a:uFillTx/>
-              <a:latin typeface="Calibri"/>
-              <a:ea typeface="+mn-ea"/>
-              <a:cs typeface="+mn-cs"/>
-            </a:endParaRPr>
-          </a:p>
-        </p:txBody>
-      </p:sp>
-      <p:sp>
-        <p:nvSpPr>
-          <p:cNvPr id="41" name="Rectangle 8">
-            <a:extLst>
-              <a:ext uri="{FF2B5EF4-FFF2-40B4-BE49-F238E27FC236}">
-                <a16:creationId xmlns:a16="http://schemas.microsoft.com/office/drawing/2014/main" id="{EBC10A51-6A0C-43FA-BC5C-F67781E2F5B6}"/>
+              <a:t>Progress</a:t>
+            </a:r>
+          </a:p>
+        </p:txBody>
+      </p:sp>
+      <p:sp>
+        <p:nvSpPr>
+          <p:cNvPr id="42" name="Rectangle 8">
+            <a:extLst>
+              <a:ext uri="{FF2B5EF4-FFF2-40B4-BE49-F238E27FC236}">
+                <a16:creationId xmlns:a16="http://schemas.microsoft.com/office/drawing/2014/main" id="{AC845BBC-A011-44B2-9C61-D0F5510EF7A9}"/>
               </a:ext>
             </a:extLst>
           </p:cNvPr>
@@ -4160,8 +4146,8 @@
         </p:nvSpPr>
         <p:spPr>
           <a:xfrm>
-            <a:off x="4901814" y="3816645"/>
-            <a:ext cx="1541395" cy="355965"/>
+            <a:off x="7261415" y="4927393"/>
+            <a:ext cx="2214060" cy="479611"/>
           </a:xfrm>
           <a:prstGeom prst="rect">
             <a:avLst/>
@@ -4219,7 +4205,7 @@
               <a:defRPr/>
             </a:pPr>
             <a:r>
-              <a:rPr kumimoji="0" lang="en-US" sz="1050" b="0" i="0" u="none" strike="noStrike" kern="0" cap="none" spc="0" normalizeH="0" baseline="0" noProof="0" dirty="0">
+              <a:rPr kumimoji="0" lang="en-US" sz="1050" b="0" i="0" u="none" strike="noStrike" kern="0" cap="none" spc="0" normalizeH="0" baseline="0" noProof="0" dirty="0" err="1">
                 <a:ln>
                   <a:noFill/>
                 </a:ln>
@@ -4233,17 +4219,310 @@
                 <a:ea typeface="+mn-ea"/>
                 <a:cs typeface="+mn-cs"/>
               </a:rPr>
-              <a:t>Progress</a:t>
-            </a:r>
-          </a:p>
-        </p:txBody>
-      </p:sp>
-      <p:sp>
-        <p:nvSpPr>
-          <p:cNvPr id="42" name="Rectangle 8">
-            <a:extLst>
-              <a:ext uri="{FF2B5EF4-FFF2-40B4-BE49-F238E27FC236}">
-                <a16:creationId xmlns:a16="http://schemas.microsoft.com/office/drawing/2014/main" id="{AC845BBC-A011-44B2-9C61-D0F5510EF7A9}"/>
+              <a:t>UniqueTaskList</a:t>
+            </a:r>
+            <a:endParaRPr kumimoji="0" lang="en-US" sz="1050" b="0" i="0" u="none" strike="noStrike" kern="0" cap="none" spc="0" normalizeH="0" baseline="0" noProof="0" dirty="0">
+              <a:ln>
+                <a:noFill/>
+              </a:ln>
+              <a:solidFill>
+                <a:srgbClr val="7030A0"/>
+              </a:solidFill>
+              <a:effectLst/>
+              <a:uLnTx/>
+              <a:uFillTx/>
+              <a:latin typeface="Calibri"/>
+              <a:ea typeface="+mn-ea"/>
+              <a:cs typeface="+mn-cs"/>
+            </a:endParaRPr>
+          </a:p>
+          <a:p>
+            <a:pPr marL="0" marR="0" lvl="0" indent="0" algn="ctr" defTabSz="914400" eaLnBrk="1" fontAlgn="auto" latinLnBrk="0" hangingPunct="1">
+              <a:lnSpc>
+                <a:spcPct val="100000"/>
+              </a:lnSpc>
+              <a:spcBef>
+                <a:spcPts val="0"/>
+              </a:spcBef>
+              <a:spcAft>
+                <a:spcPts val="0"/>
+              </a:spcAft>
+              <a:buClrTx/>
+              <a:buSzTx/>
+              <a:buFontTx/>
+              <a:buNone/>
+              <a:tabLst/>
+              <a:defRPr/>
+            </a:pPr>
+            <a:r>
+              <a:rPr kumimoji="0" lang="en-SG" sz="1050" b="0" i="0" u="none" strike="noStrike" kern="0" cap="none" spc="0" normalizeH="0" baseline="0" noProof="0" dirty="0" err="1">
+                <a:ln>
+                  <a:noFill/>
+                </a:ln>
+                <a:solidFill>
+                  <a:srgbClr val="7030A0"/>
+                </a:solidFill>
+                <a:effectLst/>
+                <a:uLnTx/>
+                <a:uFillTx/>
+                <a:latin typeface="Calibri"/>
+                <a:ea typeface="+mn-ea"/>
+                <a:cs typeface="+mn-cs"/>
+              </a:rPr>
+              <a:t>internalList</a:t>
+            </a:r>
+            <a:r>
+              <a:rPr kumimoji="0" lang="en-SG" sz="1050" b="0" i="0" u="none" strike="noStrike" kern="0" cap="none" spc="0" normalizeH="0" baseline="0" noProof="0" dirty="0">
+                <a:ln>
+                  <a:noFill/>
+                </a:ln>
+                <a:solidFill>
+                  <a:srgbClr val="7030A0"/>
+                </a:solidFill>
+                <a:effectLst/>
+                <a:uLnTx/>
+                <a:uFillTx/>
+                <a:latin typeface="Calibri"/>
+                <a:ea typeface="+mn-ea"/>
+                <a:cs typeface="+mn-cs"/>
+              </a:rPr>
+              <a:t>: </a:t>
+            </a:r>
+            <a:r>
+              <a:rPr kumimoji="0" lang="en-SG" sz="1050" b="0" i="0" u="none" strike="noStrike" kern="0" cap="none" spc="0" normalizeH="0" baseline="0" noProof="0" dirty="0" err="1">
+                <a:ln>
+                  <a:noFill/>
+                </a:ln>
+                <a:solidFill>
+                  <a:srgbClr val="7030A0"/>
+                </a:solidFill>
+                <a:effectLst/>
+                <a:uLnTx/>
+                <a:uFillTx/>
+                <a:latin typeface="Calibri"/>
+                <a:ea typeface="+mn-ea"/>
+                <a:cs typeface="+mn-cs"/>
+              </a:rPr>
+              <a:t>ObservableList</a:t>
+            </a:r>
+            <a:r>
+              <a:rPr kumimoji="0" lang="en-SG" sz="1050" b="0" i="0" u="none" strike="noStrike" kern="0" cap="none" spc="0" normalizeH="0" baseline="0" noProof="0" dirty="0">
+                <a:ln>
+                  <a:noFill/>
+                </a:ln>
+                <a:solidFill>
+                  <a:srgbClr val="7030A0"/>
+                </a:solidFill>
+                <a:effectLst/>
+                <a:uLnTx/>
+                <a:uFillTx/>
+                <a:latin typeface="Calibri"/>
+                <a:ea typeface="+mn-ea"/>
+                <a:cs typeface="+mn-cs"/>
+              </a:rPr>
+              <a:t>&lt;Task&gt;</a:t>
+            </a:r>
+          </a:p>
+        </p:txBody>
+      </p:sp>
+      <p:cxnSp>
+        <p:nvCxnSpPr>
+          <p:cNvPr id="43" name="Elbow Connector 63">
+            <a:extLst>
+              <a:ext uri="{FF2B5EF4-FFF2-40B4-BE49-F238E27FC236}">
+                <a16:creationId xmlns:a16="http://schemas.microsoft.com/office/drawing/2014/main" id="{F9A4F3AD-5126-4684-BB3B-6EB9B5E86C9E}"/>
+              </a:ext>
+            </a:extLst>
+          </p:cNvPr>
+          <p:cNvCxnSpPr>
+            <a:cxnSpLocks/>
+          </p:cNvCxnSpPr>
+          <p:nvPr/>
+        </p:nvCxnSpPr>
+        <p:spPr>
+          <a:xfrm rot="16200000" flipH="1">
+            <a:off x="5755469" y="4734933"/>
+            <a:ext cx="393610" cy="2"/>
+          </a:xfrm>
+          <a:prstGeom prst="bentConnector3">
+            <a:avLst>
+              <a:gd name="adj1" fmla="val 50000"/>
+            </a:avLst>
+          </a:prstGeom>
+          <a:ln w="19050">
+            <a:solidFill>
+              <a:srgbClr val="7030A0"/>
+            </a:solidFill>
+            <a:headEnd type="none" w="med" len="med"/>
+            <a:tailEnd type="arrow" w="med" len="med"/>
+          </a:ln>
+          <a:effectLst/>
+        </p:spPr>
+        <p:style>
+          <a:lnRef idx="1">
+            <a:schemeClr val="accent2"/>
+          </a:lnRef>
+          <a:fillRef idx="2">
+            <a:schemeClr val="accent2"/>
+          </a:fillRef>
+          <a:effectRef idx="1">
+            <a:schemeClr val="accent2"/>
+          </a:effectRef>
+          <a:fontRef idx="minor">
+            <a:schemeClr val="dk1"/>
+          </a:fontRef>
+        </p:style>
+      </p:cxnSp>
+      <p:cxnSp>
+        <p:nvCxnSpPr>
+          <p:cNvPr id="44" name="Elbow Connector 63">
+            <a:extLst>
+              <a:ext uri="{FF2B5EF4-FFF2-40B4-BE49-F238E27FC236}">
+                <a16:creationId xmlns:a16="http://schemas.microsoft.com/office/drawing/2014/main" id="{D65012CC-7268-4B5E-A62C-1E7C211BCDAC}"/>
+              </a:ext>
+            </a:extLst>
+          </p:cNvPr>
+          <p:cNvCxnSpPr>
+            <a:cxnSpLocks/>
+            <a:stCxn id="39" idx="2"/>
+            <a:endCxn id="40" idx="0"/>
+          </p:cNvCxnSpPr>
+          <p:nvPr/>
+        </p:nvCxnSpPr>
+        <p:spPr>
+          <a:xfrm rot="5400000">
+            <a:off x="4455426" y="3426445"/>
+            <a:ext cx="790196" cy="2211699"/>
+          </a:xfrm>
+          <a:prstGeom prst="bentConnector3">
+            <a:avLst>
+              <a:gd name="adj1" fmla="val 50000"/>
+            </a:avLst>
+          </a:prstGeom>
+          <a:ln w="19050">
+            <a:solidFill>
+              <a:srgbClr val="7030A0"/>
+            </a:solidFill>
+            <a:headEnd type="none" w="med" len="med"/>
+            <a:tailEnd type="arrow" w="med" len="med"/>
+          </a:ln>
+          <a:effectLst/>
+        </p:spPr>
+        <p:style>
+          <a:lnRef idx="1">
+            <a:schemeClr val="accent2"/>
+          </a:lnRef>
+          <a:fillRef idx="2">
+            <a:schemeClr val="accent2"/>
+          </a:fillRef>
+          <a:effectRef idx="1">
+            <a:schemeClr val="accent2"/>
+          </a:effectRef>
+          <a:fontRef idx="minor">
+            <a:schemeClr val="dk1"/>
+          </a:fontRef>
+        </p:style>
+      </p:cxnSp>
+      <p:cxnSp>
+        <p:nvCxnSpPr>
+          <p:cNvPr id="65" name="Elbow Connector 63">
+            <a:extLst>
+              <a:ext uri="{FF2B5EF4-FFF2-40B4-BE49-F238E27FC236}">
+                <a16:creationId xmlns:a16="http://schemas.microsoft.com/office/drawing/2014/main" id="{0E52438E-BC42-4838-9C4E-28C6C69C9276}"/>
+              </a:ext>
+            </a:extLst>
+          </p:cNvPr>
+          <p:cNvCxnSpPr>
+            <a:cxnSpLocks/>
+          </p:cNvCxnSpPr>
+          <p:nvPr/>
+        </p:nvCxnSpPr>
+        <p:spPr>
+          <a:xfrm>
+            <a:off x="5959362" y="4532882"/>
+            <a:ext cx="2434377" cy="388589"/>
+          </a:xfrm>
+          <a:prstGeom prst="bentConnector2">
+            <a:avLst/>
+          </a:prstGeom>
+          <a:ln w="19050">
+            <a:solidFill>
+              <a:srgbClr val="7030A0"/>
+            </a:solidFill>
+            <a:headEnd type="none" w="med" len="med"/>
+            <a:tailEnd type="arrow" w="med" len="med"/>
+          </a:ln>
+          <a:effectLst/>
+        </p:spPr>
+        <p:style>
+          <a:lnRef idx="1">
+            <a:schemeClr val="accent2"/>
+          </a:lnRef>
+          <a:fillRef idx="2">
+            <a:schemeClr val="accent2"/>
+          </a:fillRef>
+          <a:effectRef idx="1">
+            <a:schemeClr val="accent2"/>
+          </a:effectRef>
+          <a:fontRef idx="minor">
+            <a:schemeClr val="dk1"/>
+          </a:fontRef>
+        </p:style>
+      </p:cxnSp>
+      <p:cxnSp>
+        <p:nvCxnSpPr>
+          <p:cNvPr id="68" name="Elbow Connector 63">
+            <a:extLst>
+              <a:ext uri="{FF2B5EF4-FFF2-40B4-BE49-F238E27FC236}">
+                <a16:creationId xmlns:a16="http://schemas.microsoft.com/office/drawing/2014/main" id="{034AB860-78C6-4305-B926-3603A1A6D306}"/>
+              </a:ext>
+            </a:extLst>
+          </p:cNvPr>
+          <p:cNvCxnSpPr>
+            <a:cxnSpLocks/>
+          </p:cNvCxnSpPr>
+          <p:nvPr/>
+        </p:nvCxnSpPr>
+        <p:spPr>
+          <a:xfrm rot="16200000" flipH="1">
+            <a:off x="8252194" y="5832037"/>
+            <a:ext cx="393610" cy="2"/>
+          </a:xfrm>
+          <a:prstGeom prst="bentConnector3">
+            <a:avLst>
+              <a:gd name="adj1" fmla="val 50000"/>
+            </a:avLst>
+          </a:prstGeom>
+          <a:ln w="19050">
+            <a:solidFill>
+              <a:srgbClr val="7030A0"/>
+            </a:solidFill>
+            <a:headEnd type="none" w="med" len="med"/>
+            <a:tailEnd type="arrow" w="med" len="med"/>
+          </a:ln>
+          <a:effectLst/>
+        </p:spPr>
+        <p:style>
+          <a:lnRef idx="1">
+            <a:schemeClr val="accent2"/>
+          </a:lnRef>
+          <a:fillRef idx="2">
+            <a:schemeClr val="accent2"/>
+          </a:fillRef>
+          <a:effectRef idx="1">
+            <a:schemeClr val="accent2"/>
+          </a:effectRef>
+          <a:fontRef idx="minor">
+            <a:schemeClr val="dk1"/>
+          </a:fontRef>
+        </p:style>
+      </p:cxnSp>
+      <p:sp>
+        <p:nvSpPr>
+          <p:cNvPr id="69" name="Rectangle 8">
+            <a:extLst>
+              <a:ext uri="{FF2B5EF4-FFF2-40B4-BE49-F238E27FC236}">
+                <a16:creationId xmlns:a16="http://schemas.microsoft.com/office/drawing/2014/main" id="{499E6118-6C1D-4E61-9062-AA0949F2B841}"/>
               </a:ext>
             </a:extLst>
           </p:cNvPr>
@@ -4252,8 +4531,8 @@
         </p:nvSpPr>
         <p:spPr>
           <a:xfrm>
-            <a:off x="6636425" y="3804649"/>
-            <a:ext cx="1541395" cy="355965"/>
+            <a:off x="7474587" y="6028844"/>
+            <a:ext cx="1945755" cy="479611"/>
           </a:xfrm>
           <a:prstGeom prst="rect">
             <a:avLst/>
@@ -4311,305 +4590,6 @@
               <a:defRPr/>
             </a:pPr>
             <a:r>
-              <a:rPr kumimoji="0" lang="en-US" sz="1050" b="0" i="0" u="none" strike="noStrike" kern="0" cap="none" spc="0" normalizeH="0" baseline="0" noProof="0" dirty="0" err="1">
-                <a:ln>
-                  <a:noFill/>
-                </a:ln>
-                <a:solidFill>
-                  <a:srgbClr val="7030A0"/>
-                </a:solidFill>
-                <a:effectLst/>
-                <a:uLnTx/>
-                <a:uFillTx/>
-                <a:latin typeface="Calibri"/>
-                <a:ea typeface="+mn-ea"/>
-                <a:cs typeface="+mn-cs"/>
-              </a:rPr>
-              <a:t>UniqueTaskList</a:t>
-            </a:r>
-            <a:endParaRPr kumimoji="0" lang="en-SG" sz="1050" b="0" i="0" u="none" strike="noStrike" kern="0" cap="none" spc="0" normalizeH="0" baseline="0" noProof="0" dirty="0">
-              <a:ln>
-                <a:noFill/>
-              </a:ln>
-              <a:solidFill>
-                <a:srgbClr val="7030A0"/>
-              </a:solidFill>
-              <a:effectLst/>
-              <a:uLnTx/>
-              <a:uFillTx/>
-              <a:latin typeface="Calibri"/>
-              <a:ea typeface="+mn-ea"/>
-              <a:cs typeface="+mn-cs"/>
-            </a:endParaRPr>
-          </a:p>
-        </p:txBody>
-      </p:sp>
-      <p:cxnSp>
-        <p:nvCxnSpPr>
-          <p:cNvPr id="43" name="Elbow Connector 63">
-            <a:extLst>
-              <a:ext uri="{FF2B5EF4-FFF2-40B4-BE49-F238E27FC236}">
-                <a16:creationId xmlns:a16="http://schemas.microsoft.com/office/drawing/2014/main" id="{F9A4F3AD-5126-4684-BB3B-6EB9B5E86C9E}"/>
-              </a:ext>
-            </a:extLst>
-          </p:cNvPr>
-          <p:cNvCxnSpPr>
-            <a:cxnSpLocks/>
-          </p:cNvCxnSpPr>
-          <p:nvPr/>
-        </p:nvCxnSpPr>
-        <p:spPr>
-          <a:xfrm rot="16200000" flipH="1">
-            <a:off x="5602725" y="3662085"/>
-            <a:ext cx="292136" cy="2"/>
-          </a:xfrm>
-          <a:prstGeom prst="bentConnector3">
-            <a:avLst>
-              <a:gd name="adj1" fmla="val 50000"/>
-            </a:avLst>
-          </a:prstGeom>
-          <a:ln w="19050">
-            <a:solidFill>
-              <a:srgbClr val="7030A0"/>
-            </a:solidFill>
-            <a:headEnd type="none" w="med" len="med"/>
-            <a:tailEnd type="arrow" w="med" len="med"/>
-          </a:ln>
-          <a:effectLst/>
-        </p:spPr>
-        <p:style>
-          <a:lnRef idx="1">
-            <a:schemeClr val="accent2"/>
-          </a:lnRef>
-          <a:fillRef idx="2">
-            <a:schemeClr val="accent2"/>
-          </a:fillRef>
-          <a:effectRef idx="1">
-            <a:schemeClr val="accent2"/>
-          </a:effectRef>
-          <a:fontRef idx="minor">
-            <a:schemeClr val="dk1"/>
-          </a:fontRef>
-        </p:style>
-      </p:cxnSp>
-      <p:cxnSp>
-        <p:nvCxnSpPr>
-          <p:cNvPr id="44" name="Elbow Connector 63">
-            <a:extLst>
-              <a:ext uri="{FF2B5EF4-FFF2-40B4-BE49-F238E27FC236}">
-                <a16:creationId xmlns:a16="http://schemas.microsoft.com/office/drawing/2014/main" id="{D65012CC-7268-4B5E-A62C-1E7C211BCDAC}"/>
-              </a:ext>
-            </a:extLst>
-          </p:cNvPr>
-          <p:cNvCxnSpPr>
-            <a:cxnSpLocks/>
-            <a:stCxn id="39" idx="2"/>
-            <a:endCxn id="40" idx="0"/>
-          </p:cNvCxnSpPr>
-          <p:nvPr/>
-        </p:nvCxnSpPr>
-        <p:spPr>
-          <a:xfrm rot="5400000">
-            <a:off x="4696744" y="2764596"/>
-            <a:ext cx="293207" cy="1810891"/>
-          </a:xfrm>
-          <a:prstGeom prst="bentConnector3">
-            <a:avLst>
-              <a:gd name="adj1" fmla="val 50000"/>
-            </a:avLst>
-          </a:prstGeom>
-          <a:ln w="19050">
-            <a:solidFill>
-              <a:srgbClr val="7030A0"/>
-            </a:solidFill>
-            <a:headEnd type="none" w="med" len="med"/>
-            <a:tailEnd type="arrow" w="med" len="med"/>
-          </a:ln>
-          <a:effectLst/>
-        </p:spPr>
-        <p:style>
-          <a:lnRef idx="1">
-            <a:schemeClr val="accent2"/>
-          </a:lnRef>
-          <a:fillRef idx="2">
-            <a:schemeClr val="accent2"/>
-          </a:fillRef>
-          <a:effectRef idx="1">
-            <a:schemeClr val="accent2"/>
-          </a:effectRef>
-          <a:fontRef idx="minor">
-            <a:schemeClr val="dk1"/>
-          </a:fontRef>
-        </p:style>
-      </p:cxnSp>
-      <p:cxnSp>
-        <p:nvCxnSpPr>
-          <p:cNvPr id="65" name="Elbow Connector 63">
-            <a:extLst>
-              <a:ext uri="{FF2B5EF4-FFF2-40B4-BE49-F238E27FC236}">
-                <a16:creationId xmlns:a16="http://schemas.microsoft.com/office/drawing/2014/main" id="{0E52438E-BC42-4838-9C4E-28C6C69C9276}"/>
-              </a:ext>
-            </a:extLst>
-          </p:cNvPr>
-          <p:cNvCxnSpPr>
-            <a:cxnSpLocks/>
-            <a:endCxn id="42" idx="0"/>
-          </p:cNvCxnSpPr>
-          <p:nvPr/>
-        </p:nvCxnSpPr>
-        <p:spPr>
-          <a:xfrm>
-            <a:off x="5748792" y="3668194"/>
-            <a:ext cx="1658331" cy="136455"/>
-          </a:xfrm>
-          <a:prstGeom prst="bentConnector2">
-            <a:avLst/>
-          </a:prstGeom>
-          <a:ln w="19050">
-            <a:solidFill>
-              <a:srgbClr val="7030A0"/>
-            </a:solidFill>
-            <a:headEnd type="none" w="med" len="med"/>
-            <a:tailEnd type="arrow" w="med" len="med"/>
-          </a:ln>
-          <a:effectLst/>
-        </p:spPr>
-        <p:style>
-          <a:lnRef idx="1">
-            <a:schemeClr val="accent2"/>
-          </a:lnRef>
-          <a:fillRef idx="2">
-            <a:schemeClr val="accent2"/>
-          </a:fillRef>
-          <a:effectRef idx="1">
-            <a:schemeClr val="accent2"/>
-          </a:effectRef>
-          <a:fontRef idx="minor">
-            <a:schemeClr val="dk1"/>
-          </a:fontRef>
-        </p:style>
-      </p:cxnSp>
-      <p:cxnSp>
-        <p:nvCxnSpPr>
-          <p:cNvPr id="68" name="Elbow Connector 63">
-            <a:extLst>
-              <a:ext uri="{FF2B5EF4-FFF2-40B4-BE49-F238E27FC236}">
-                <a16:creationId xmlns:a16="http://schemas.microsoft.com/office/drawing/2014/main" id="{034AB860-78C6-4305-B926-3603A1A6D306}"/>
-              </a:ext>
-            </a:extLst>
-          </p:cNvPr>
-          <p:cNvCxnSpPr>
-            <a:cxnSpLocks/>
-          </p:cNvCxnSpPr>
-          <p:nvPr/>
-        </p:nvCxnSpPr>
-        <p:spPr>
-          <a:xfrm rot="16200000" flipH="1">
-            <a:off x="7261055" y="4462403"/>
-            <a:ext cx="292136" cy="2"/>
-          </a:xfrm>
-          <a:prstGeom prst="bentConnector3">
-            <a:avLst>
-              <a:gd name="adj1" fmla="val 50000"/>
-            </a:avLst>
-          </a:prstGeom>
-          <a:ln w="19050">
-            <a:solidFill>
-              <a:srgbClr val="7030A0"/>
-            </a:solidFill>
-            <a:headEnd type="none" w="med" len="med"/>
-            <a:tailEnd type="arrow" w="med" len="med"/>
-          </a:ln>
-          <a:effectLst/>
-        </p:spPr>
-        <p:style>
-          <a:lnRef idx="1">
-            <a:schemeClr val="accent2"/>
-          </a:lnRef>
-          <a:fillRef idx="2">
-            <a:schemeClr val="accent2"/>
-          </a:fillRef>
-          <a:effectRef idx="1">
-            <a:schemeClr val="accent2"/>
-          </a:effectRef>
-          <a:fontRef idx="minor">
-            <a:schemeClr val="dk1"/>
-          </a:fontRef>
-        </p:style>
-      </p:cxnSp>
-      <p:sp>
-        <p:nvSpPr>
-          <p:cNvPr id="69" name="Rectangle 8">
-            <a:extLst>
-              <a:ext uri="{FF2B5EF4-FFF2-40B4-BE49-F238E27FC236}">
-                <a16:creationId xmlns:a16="http://schemas.microsoft.com/office/drawing/2014/main" id="{499E6118-6C1D-4E61-9062-AA0949F2B841}"/>
-              </a:ext>
-            </a:extLst>
-          </p:cNvPr>
-          <p:cNvSpPr/>
-          <p:nvPr/>
-        </p:nvSpPr>
-        <p:spPr>
-          <a:xfrm>
-            <a:off x="6636425" y="4616704"/>
-            <a:ext cx="1541395" cy="355965"/>
-          </a:xfrm>
-          <a:prstGeom prst="rect">
-            <a:avLst/>
-          </a:prstGeom>
-          <a:gradFill rotWithShape="1">
-            <a:gsLst>
-              <a:gs pos="0">
-                <a:srgbClr val="8064A2">
-                  <a:tint val="50000"/>
-                  <a:satMod val="300000"/>
-                </a:srgbClr>
-              </a:gs>
-              <a:gs pos="35000">
-                <a:srgbClr val="8064A2">
-                  <a:tint val="37000"/>
-                  <a:satMod val="300000"/>
-                </a:srgbClr>
-              </a:gs>
-              <a:gs pos="100000">
-                <a:srgbClr val="8064A2">
-                  <a:tint val="15000"/>
-                  <a:satMod val="350000"/>
-                </a:srgbClr>
-              </a:gs>
-            </a:gsLst>
-            <a:lin ang="16200000" scaled="1"/>
-          </a:gradFill>
-          <a:ln w="19050" cap="flat" cmpd="sng" algn="ctr">
-            <a:solidFill>
-              <a:srgbClr val="7030A0"/>
-            </a:solidFill>
-            <a:prstDash val="solid"/>
-          </a:ln>
-          <a:effectLst/>
-        </p:spPr>
-        <p:txBody>
-          <a:bodyPr rtlCol="0" anchor="ctr"/>
-          <a:lstStyle/>
-          <a:p>
-            <a:pPr marL="0" marR="0" lvl="0" indent="0" algn="ctr" defTabSz="914400" eaLnBrk="1" fontAlgn="auto" latinLnBrk="0" hangingPunct="1">
-              <a:lnSpc>
-                <a:spcPct val="100000"/>
-              </a:lnSpc>
-              <a:spcBef>
-                <a:spcPts val="0"/>
-              </a:spcBef>
-              <a:spcAft>
-                <a:spcPts val="0"/>
-              </a:spcAft>
-              <a:buClrTx/>
-              <a:buSzTx/>
-              <a:buFontTx/>
-              <a:buNone/>
-              <a:tabLst/>
-              <a:defRPr/>
-            </a:pPr>
-            <a:r>
               <a:rPr kumimoji="0" lang="en-US" sz="1050" b="0" i="0" u="none" strike="noStrike" kern="0" cap="none" spc="0" normalizeH="0" baseline="0" noProof="0" dirty="0">
                 <a:ln>
                   <a:noFill/>
@@ -4657,8 +4637,8 @@
         </p:nvSpPr>
         <p:spPr>
           <a:xfrm>
-            <a:off x="7289098" y="4168846"/>
-            <a:ext cx="236048" cy="155722"/>
+            <a:off x="8300012" y="5421999"/>
+            <a:ext cx="297972" cy="209813"/>
           </a:xfrm>
           <a:prstGeom prst="flowChartDecision">
             <a:avLst/>
@@ -4708,8 +4688,8 @@
         </p:nvSpPr>
         <p:spPr>
           <a:xfrm>
-            <a:off x="5780897" y="1993699"/>
-            <a:ext cx="189257" cy="178683"/>
+            <a:off x="5717467" y="2116496"/>
+            <a:ext cx="238906" cy="240749"/>
           </a:xfrm>
           <a:prstGeom prst="rect">
             <a:avLst/>
@@ -4753,8 +4733,8 @@
         </p:nvSpPr>
         <p:spPr>
           <a:xfrm>
-            <a:off x="5763870" y="2854056"/>
-            <a:ext cx="189257" cy="178683"/>
+            <a:off x="5717467" y="3296153"/>
+            <a:ext cx="238906" cy="240749"/>
           </a:xfrm>
           <a:prstGeom prst="rect">
             <a:avLst/>
@@ -4798,8 +4778,8 @@
         </p:nvSpPr>
         <p:spPr>
           <a:xfrm>
-            <a:off x="3689633" y="3625966"/>
-            <a:ext cx="189257" cy="178683"/>
+            <a:off x="3491285" y="4748303"/>
+            <a:ext cx="238906" cy="240749"/>
           </a:xfrm>
           <a:prstGeom prst="rect">
             <a:avLst/>
@@ -4843,8 +4823,8 @@
         </p:nvSpPr>
         <p:spPr>
           <a:xfrm>
-            <a:off x="5511678" y="3654279"/>
-            <a:ext cx="189257" cy="178683"/>
+            <a:off x="5700506" y="4747595"/>
+            <a:ext cx="238906" cy="240749"/>
           </a:xfrm>
           <a:prstGeom prst="rect">
             <a:avLst/>
@@ -4888,8 +4868,8 @@
         </p:nvSpPr>
         <p:spPr>
           <a:xfrm>
-            <a:off x="7430517" y="3625966"/>
-            <a:ext cx="189257" cy="178683"/>
+            <a:off x="8141561" y="4746934"/>
+            <a:ext cx="238906" cy="240749"/>
           </a:xfrm>
           <a:prstGeom prst="rect">
             <a:avLst/>
@@ -4933,8 +4913,8 @@
         </p:nvSpPr>
         <p:spPr>
           <a:xfrm>
-            <a:off x="7430517" y="4462403"/>
-            <a:ext cx="189257" cy="178683"/>
+            <a:off x="8208559" y="5893077"/>
+            <a:ext cx="238906" cy="240749"/>
           </a:xfrm>
           <a:prstGeom prst="rect">
             <a:avLst/>
@@ -4978,8 +4958,8 @@
         </p:nvSpPr>
         <p:spPr>
           <a:xfrm>
-            <a:off x="3649954" y="3429000"/>
-            <a:ext cx="881018" cy="261610"/>
+            <a:off x="3266365" y="4524340"/>
+            <a:ext cx="1112138" cy="261610"/>
           </a:xfrm>
           <a:prstGeom prst="rect">
             <a:avLst/>
@@ -5009,80 +4989,116 @@
           </a:p>
         </p:txBody>
       </p:sp>
-      <p:sp>
-        <p:nvSpPr>
-          <p:cNvPr id="97" name="Rectangle 8">
-            <a:extLst>
-              <a:ext uri="{FF2B5EF4-FFF2-40B4-BE49-F238E27FC236}">
-                <a16:creationId xmlns:a16="http://schemas.microsoft.com/office/drawing/2014/main" id="{7B201D94-F5E1-4683-9079-911A2908C629}"/>
-              </a:ext>
-            </a:extLst>
-          </p:cNvPr>
-          <p:cNvSpPr/>
+      <p:grpSp>
+        <p:nvGrpSpPr>
+          <p:cNvPr id="23" name="Group 22">
+            <a:extLst>
+              <a:ext uri="{FF2B5EF4-FFF2-40B4-BE49-F238E27FC236}">
+                <a16:creationId xmlns:a16="http://schemas.microsoft.com/office/drawing/2014/main" id="{7A041058-B3B4-42B9-9965-35BE585C3A13}"/>
+              </a:ext>
+            </a:extLst>
+          </p:cNvPr>
+          <p:cNvGrpSpPr/>
           <p:nvPr/>
-        </p:nvSpPr>
-        <p:spPr>
+        </p:nvGrpSpPr>
+        <p:grpSpPr>
           <a:xfrm>
-            <a:off x="6950697" y="1328113"/>
-            <a:ext cx="1541395" cy="355965"/>
+            <a:off x="4677059" y="2325662"/>
+            <a:ext cx="2584356" cy="479611"/>
+            <a:chOff x="4636315" y="1429198"/>
+            <a:chExt cx="2584356" cy="479611"/>
           </a:xfrm>
-          <a:prstGeom prst="rect">
-            <a:avLst/>
-          </a:prstGeom>
-          <a:gradFill rotWithShape="1">
-            <a:gsLst>
-              <a:gs pos="0">
-                <a:srgbClr val="8064A2">
-                  <a:tint val="50000"/>
-                  <a:satMod val="300000"/>
-                </a:srgbClr>
-              </a:gs>
-              <a:gs pos="35000">
-                <a:srgbClr val="8064A2">
-                  <a:tint val="37000"/>
-                  <a:satMod val="300000"/>
-                </a:srgbClr>
-              </a:gs>
-              <a:gs pos="100000">
-                <a:srgbClr val="8064A2">
-                  <a:tint val="15000"/>
-                  <a:satMod val="350000"/>
-                </a:srgbClr>
-              </a:gs>
-            </a:gsLst>
-            <a:lin ang="16200000" scaled="1"/>
-          </a:gradFill>
-          <a:ln w="19050" cap="flat" cmpd="sng" algn="ctr">
-            <a:solidFill>
-              <a:srgbClr val="7030A0"/>
-            </a:solidFill>
-            <a:prstDash val="solid"/>
-          </a:ln>
-          <a:effectLst/>
-        </p:spPr>
-        <p:txBody>
-          <a:bodyPr rtlCol="0" anchor="ctr"/>
-          <a:lstStyle/>
-          <a:p>
-            <a:pPr marL="0" marR="0" lvl="0" indent="0" algn="ctr" defTabSz="914400" eaLnBrk="1" fontAlgn="auto" latinLnBrk="0" hangingPunct="1">
-              <a:lnSpc>
-                <a:spcPct val="100000"/>
-              </a:lnSpc>
-              <a:spcBef>
-                <a:spcPts val="0"/>
-              </a:spcBef>
-              <a:spcAft>
-                <a:spcPts val="0"/>
-              </a:spcAft>
-              <a:buClrTx/>
-              <a:buSzTx/>
-              <a:buFontTx/>
-              <a:buNone/>
-              <a:tabLst/>
-              <a:defRPr/>
-            </a:pPr>
-            <a:r>
-              <a:rPr kumimoji="0" lang="en-US" sz="1050" b="0" i="0" u="none" strike="noStrike" kern="0" cap="none" spc="0" normalizeH="0" baseline="0" noProof="0" dirty="0">
+        </p:grpSpPr>
+        <p:sp>
+          <p:nvSpPr>
+            <p:cNvPr id="13" name="Rectangle 8">
+              <a:extLst>
+                <a:ext uri="{FF2B5EF4-FFF2-40B4-BE49-F238E27FC236}">
+                  <a16:creationId xmlns:a16="http://schemas.microsoft.com/office/drawing/2014/main" id="{7A153241-7F74-4F60-92F5-69ACB929F9E3}"/>
+                </a:ext>
+              </a:extLst>
+            </p:cNvPr>
+            <p:cNvSpPr/>
+            <p:nvPr/>
+          </p:nvSpPr>
+          <p:spPr>
+            <a:xfrm>
+              <a:off x="4642667" y="1429198"/>
+              <a:ext cx="2578004" cy="479611"/>
+            </a:xfrm>
+            <a:prstGeom prst="rect">
+              <a:avLst/>
+            </a:prstGeom>
+            <a:gradFill rotWithShape="1">
+              <a:gsLst>
+                <a:gs pos="0">
+                  <a:srgbClr val="8064A2">
+                    <a:tint val="50000"/>
+                    <a:satMod val="300000"/>
+                  </a:srgbClr>
+                </a:gs>
+                <a:gs pos="35000">
+                  <a:srgbClr val="8064A2">
+                    <a:tint val="37000"/>
+                    <a:satMod val="300000"/>
+                  </a:srgbClr>
+                </a:gs>
+                <a:gs pos="100000">
+                  <a:srgbClr val="8064A2">
+                    <a:tint val="15000"/>
+                    <a:satMod val="350000"/>
+                  </a:srgbClr>
+                </a:gs>
+              </a:gsLst>
+              <a:lin ang="16200000" scaled="1"/>
+            </a:gradFill>
+            <a:ln w="19050" cap="flat" cmpd="sng" algn="ctr">
+              <a:solidFill>
+                <a:srgbClr val="7030A0"/>
+              </a:solidFill>
+              <a:prstDash val="solid"/>
+            </a:ln>
+            <a:effectLst/>
+          </p:spPr>
+          <p:txBody>
+            <a:bodyPr rtlCol="0" anchor="ctr"/>
+            <a:lstStyle/>
+            <a:p>
+              <a:pPr marL="0" marR="0" lvl="0" indent="0" algn="ctr" defTabSz="914400" eaLnBrk="1" fontAlgn="auto" latinLnBrk="0" hangingPunct="1">
+                <a:lnSpc>
+                  <a:spcPct val="100000"/>
+                </a:lnSpc>
+                <a:spcBef>
+                  <a:spcPts val="0"/>
+                </a:spcBef>
+                <a:spcAft>
+                  <a:spcPts val="0"/>
+                </a:spcAft>
+                <a:buClrTx/>
+                <a:buSzTx/>
+                <a:buFontTx/>
+                <a:buNone/>
+                <a:tabLst/>
+                <a:defRPr/>
+              </a:pPr>
+              <a:r>
+                <a:rPr kumimoji="0" lang="en-US" sz="1050" b="0" i="0" u="none" strike="noStrike" kern="0" cap="none" spc="0" normalizeH="0" baseline="0" noProof="0" dirty="0" err="1">
+                  <a:ln>
+                    <a:noFill/>
+                  </a:ln>
+                  <a:solidFill>
+                    <a:srgbClr val="7030A0"/>
+                  </a:solidFill>
+                  <a:effectLst/>
+                  <a:uLnTx/>
+                  <a:uFillTx/>
+                  <a:latin typeface="Calibri"/>
+                  <a:ea typeface="+mn-ea"/>
+                  <a:cs typeface="+mn-cs"/>
+                </a:rPr>
+                <a:t>UniqueMilestoneList</a:t>
+              </a:r>
+              <a:endParaRPr kumimoji="0" lang="en-US" sz="1050" b="0" i="0" u="none" strike="noStrike" kern="0" cap="none" spc="0" normalizeH="0" baseline="0" noProof="0" dirty="0">
                 <a:ln>
                   <a:noFill/>
                 </a:ln>
@@ -5095,149 +5111,210 @@
                 <a:latin typeface="Calibri"/>
                 <a:ea typeface="+mn-ea"/>
                 <a:cs typeface="+mn-cs"/>
-              </a:rPr>
-              <a:t>&lt;&lt;interface&gt;&gt;</a:t>
-            </a:r>
-          </a:p>
-          <a:p>
-            <a:pPr marL="0" marR="0" lvl="0" indent="0" algn="ctr" defTabSz="914400" eaLnBrk="1" fontAlgn="auto" latinLnBrk="0" hangingPunct="1">
-              <a:lnSpc>
-                <a:spcPct val="100000"/>
-              </a:lnSpc>
-              <a:spcBef>
-                <a:spcPts val="0"/>
-              </a:spcBef>
-              <a:spcAft>
-                <a:spcPts val="0"/>
-              </a:spcAft>
-              <a:buClrTx/>
-              <a:buSzTx/>
-              <a:buFontTx/>
-              <a:buNone/>
-              <a:tabLst/>
-              <a:defRPr/>
-            </a:pPr>
-            <a:r>
-              <a:rPr lang="en-US" sz="1050" kern="0" dirty="0" err="1">
+              </a:endParaRPr>
+            </a:p>
+            <a:p>
+              <a:pPr marL="0" marR="0" lvl="0" indent="0" algn="ctr" defTabSz="914400" eaLnBrk="1" fontAlgn="auto" latinLnBrk="0" hangingPunct="1">
+                <a:lnSpc>
+                  <a:spcPct val="100000"/>
+                </a:lnSpc>
+                <a:spcBef>
+                  <a:spcPts val="0"/>
+                </a:spcBef>
+                <a:spcAft>
+                  <a:spcPts val="0"/>
+                </a:spcAft>
+                <a:buClrTx/>
+                <a:buSzTx/>
+                <a:buFontTx/>
+                <a:buNone/>
+                <a:tabLst/>
+                <a:defRPr/>
+              </a:pPr>
+              <a:r>
+                <a:rPr lang="en-SG" sz="1050" kern="0" dirty="0" err="1">
+                  <a:solidFill>
+                    <a:srgbClr val="7030A0"/>
+                  </a:solidFill>
+                  <a:latin typeface="Calibri"/>
+                </a:rPr>
+                <a:t>internalList</a:t>
+              </a:r>
+              <a:r>
+                <a:rPr lang="en-SG" sz="1050" kern="0" dirty="0">
+                  <a:solidFill>
+                    <a:srgbClr val="7030A0"/>
+                  </a:solidFill>
+                  <a:latin typeface="Calibri"/>
+                </a:rPr>
+                <a:t>: </a:t>
+              </a:r>
+              <a:r>
+                <a:rPr lang="en-SG" sz="1050" kern="0" dirty="0" err="1">
+                  <a:solidFill>
+                    <a:srgbClr val="7030A0"/>
+                  </a:solidFill>
+                  <a:latin typeface="Calibri"/>
+                </a:rPr>
+                <a:t>ObservableList</a:t>
+              </a:r>
+              <a:r>
+                <a:rPr lang="en-SG" sz="1050" kern="0" dirty="0">
+                  <a:solidFill>
+                    <a:srgbClr val="7030A0"/>
+                  </a:solidFill>
+                  <a:latin typeface="Calibri"/>
+                </a:rPr>
+                <a:t>&lt;Milestone&gt;</a:t>
+              </a:r>
+              <a:endParaRPr kumimoji="0" lang="en-SG" sz="1050" b="0" i="0" strike="noStrike" kern="0" cap="none" spc="0" normalizeH="0" baseline="0" noProof="0" dirty="0">
+                <a:ln>
+                  <a:noFill/>
+                </a:ln>
                 <a:solidFill>
                   <a:srgbClr val="7030A0"/>
                 </a:solidFill>
+                <a:effectLst/>
+                <a:uLnTx/>
+                <a:uFillTx/>
                 <a:latin typeface="Calibri"/>
-              </a:rPr>
-              <a:t>ObservableList</a:t>
-            </a:r>
-            <a:endParaRPr kumimoji="0" lang="en-US" sz="1050" b="0" i="0" u="none" strike="noStrike" kern="0" cap="none" spc="0" normalizeH="0" baseline="0" noProof="0" dirty="0">
-              <a:ln>
-                <a:noFill/>
-              </a:ln>
-              <a:solidFill>
-                <a:srgbClr val="7030A0"/>
-              </a:solidFill>
-              <a:effectLst/>
-              <a:uLnTx/>
-              <a:uFillTx/>
-              <a:latin typeface="Calibri"/>
-              <a:ea typeface="+mn-ea"/>
-              <a:cs typeface="+mn-cs"/>
-            </a:endParaRPr>
-          </a:p>
-        </p:txBody>
-      </p:sp>
+                <a:ea typeface="+mn-ea"/>
+                <a:cs typeface="+mn-cs"/>
+              </a:endParaRPr>
+            </a:p>
+          </p:txBody>
+        </p:sp>
+        <p:cxnSp>
+          <p:nvCxnSpPr>
+            <p:cNvPr id="15" name="Straight Connector 14">
+              <a:extLst>
+                <a:ext uri="{FF2B5EF4-FFF2-40B4-BE49-F238E27FC236}">
+                  <a16:creationId xmlns:a16="http://schemas.microsoft.com/office/drawing/2014/main" id="{7EABC666-1FB2-41DD-8D6A-0DBA88DD52DA}"/>
+                </a:ext>
+              </a:extLst>
+            </p:cNvPr>
+            <p:cNvCxnSpPr>
+              <a:cxnSpLocks/>
+              <a:endCxn id="13" idx="3"/>
+            </p:cNvCxnSpPr>
+            <p:nvPr/>
+          </p:nvCxnSpPr>
+          <p:spPr>
+            <a:xfrm flipV="1">
+              <a:off x="4636315" y="1669004"/>
+              <a:ext cx="2584356" cy="6832"/>
+            </a:xfrm>
+            <a:prstGeom prst="line">
+              <a:avLst/>
+            </a:prstGeom>
+          </p:spPr>
+          <p:style>
+            <a:lnRef idx="1">
+              <a:schemeClr val="dk1"/>
+            </a:lnRef>
+            <a:fillRef idx="0">
+              <a:schemeClr val="dk1"/>
+            </a:fillRef>
+            <a:effectRef idx="0">
+              <a:schemeClr val="dk1"/>
+            </a:effectRef>
+            <a:fontRef idx="minor">
+              <a:schemeClr val="tx1"/>
+            </a:fontRef>
+          </p:style>
+        </p:cxnSp>
+      </p:grpSp>
       <p:cxnSp>
         <p:nvCxnSpPr>
-          <p:cNvPr id="30" name="Elbow Connector 63">
-            <a:extLst>
-              <a:ext uri="{FF2B5EF4-FFF2-40B4-BE49-F238E27FC236}">
-                <a16:creationId xmlns:a16="http://schemas.microsoft.com/office/drawing/2014/main" id="{5AA3624A-33E1-4932-8800-CF543565BF98}"/>
+          <p:cNvPr id="46" name="Straight Connector 45">
+            <a:extLst>
+              <a:ext uri="{FF2B5EF4-FFF2-40B4-BE49-F238E27FC236}">
+                <a16:creationId xmlns:a16="http://schemas.microsoft.com/office/drawing/2014/main" id="{E205C149-C7BC-48BF-97FC-046AC16555B4}"/>
               </a:ext>
             </a:extLst>
           </p:cNvPr>
           <p:cNvCxnSpPr>
             <a:cxnSpLocks/>
-            <a:stCxn id="13" idx="3"/>
-            <a:endCxn id="97" idx="2"/>
+            <a:stCxn id="42" idx="1"/>
+            <a:endCxn id="42" idx="3"/>
           </p:cNvCxnSpPr>
           <p:nvPr/>
         </p:nvCxnSpPr>
         <p:spPr>
-          <a:xfrm flipV="1">
-            <a:off x="6519492" y="1684078"/>
-            <a:ext cx="1201903" cy="656168"/>
+          <a:xfrm>
+            <a:off x="7261415" y="5167199"/>
+            <a:ext cx="2214060" cy="0"/>
           </a:xfrm>
-          <a:prstGeom prst="bentConnector2">
+          <a:prstGeom prst="line">
             <a:avLst/>
           </a:prstGeom>
+        </p:spPr>
+        <p:style>
+          <a:lnRef idx="1">
+            <a:schemeClr val="dk1"/>
+          </a:lnRef>
+          <a:fillRef idx="0">
+            <a:schemeClr val="dk1"/>
+          </a:fillRef>
+          <a:effectRef idx="0">
+            <a:schemeClr val="dk1"/>
+          </a:effectRef>
+          <a:fontRef idx="minor">
+            <a:schemeClr val="tx1"/>
+          </a:fontRef>
+        </p:style>
+      </p:cxnSp>
+      <p:sp>
+        <p:nvSpPr>
+          <p:cNvPr id="58" name="Flowchart: Decision 96">
+            <a:extLst>
+              <a:ext uri="{FF2B5EF4-FFF2-40B4-BE49-F238E27FC236}">
+                <a16:creationId xmlns:a16="http://schemas.microsoft.com/office/drawing/2014/main" id="{D6E24DEE-A213-442F-8F2C-2EDCA0B78483}"/>
+              </a:ext>
+            </a:extLst>
+          </p:cNvPr>
+          <p:cNvSpPr/>
+          <p:nvPr/>
+        </p:nvSpPr>
+        <p:spPr>
+          <a:xfrm>
+            <a:off x="5819959" y="2823230"/>
+            <a:ext cx="297972" cy="209813"/>
+          </a:xfrm>
+          <a:prstGeom prst="flowChartDecision">
+            <a:avLst/>
+          </a:prstGeom>
+          <a:noFill/>
           <a:ln w="19050">
             <a:solidFill>
               <a:srgbClr val="7030A0"/>
             </a:solidFill>
-            <a:headEnd type="none" w="med" len="med"/>
-            <a:tailEnd type="arrow" w="med" len="med"/>
           </a:ln>
           <a:effectLst/>
         </p:spPr>
         <p:style>
           <a:lnRef idx="1">
-            <a:schemeClr val="accent2"/>
+            <a:schemeClr val="accent6"/>
           </a:lnRef>
           <a:fillRef idx="2">
-            <a:schemeClr val="accent2"/>
+            <a:schemeClr val="accent6"/>
           </a:fillRef>
           <a:effectRef idx="1">
-            <a:schemeClr val="accent2"/>
+            <a:schemeClr val="accent6"/>
           </a:effectRef>
           <a:fontRef idx="minor">
             <a:schemeClr val="dk1"/>
           </a:fontRef>
         </p:style>
-      </p:cxnSp>
-      <p:cxnSp>
-        <p:nvCxnSpPr>
-          <p:cNvPr id="45" name="Elbow Connector 63">
-            <a:extLst>
-              <a:ext uri="{FF2B5EF4-FFF2-40B4-BE49-F238E27FC236}">
-                <a16:creationId xmlns:a16="http://schemas.microsoft.com/office/drawing/2014/main" id="{A50C2889-4CF8-4DFD-BC10-01DB2FE02382}"/>
-              </a:ext>
-            </a:extLst>
-          </p:cNvPr>
-          <p:cNvCxnSpPr>
-            <a:cxnSpLocks/>
-            <a:stCxn id="42" idx="3"/>
-          </p:cNvCxnSpPr>
-          <p:nvPr/>
-        </p:nvCxnSpPr>
-        <p:spPr>
-          <a:xfrm flipV="1">
-            <a:off x="8177820" y="1692310"/>
-            <a:ext cx="137596" cy="2290322"/>
-          </a:xfrm>
-          <a:prstGeom prst="bentConnector2">
-            <a:avLst/>
-          </a:prstGeom>
-          <a:ln w="19050">
-            <a:solidFill>
-              <a:srgbClr val="7030A0"/>
-            </a:solidFill>
-            <a:headEnd type="none" w="med" len="med"/>
-            <a:tailEnd type="arrow" w="med" len="med"/>
-          </a:ln>
-          <a:effectLst/>
-        </p:spPr>
-        <p:style>
-          <a:lnRef idx="1">
-            <a:schemeClr val="accent2"/>
-          </a:lnRef>
-          <a:fillRef idx="2">
-            <a:schemeClr val="accent2"/>
-          </a:fillRef>
-          <a:effectRef idx="1">
-            <a:schemeClr val="accent2"/>
-          </a:effectRef>
-          <a:fontRef idx="minor">
-            <a:schemeClr val="dk1"/>
-          </a:fontRef>
-        </p:style>
-      </p:cxnSp>
+        <p:txBody>
+          <a:bodyPr rtlCol="0" anchor="ctr"/>
+          <a:lstStyle/>
+          <a:p>
+            <a:pPr algn="ctr"/>
+            <a:endParaRPr lang="en-US" sz="1050"/>
+          </a:p>
+        </p:txBody>
+      </p:sp>
     </p:spTree>
     <p:extLst>
       <p:ext uri="{BB962C8B-B14F-4D97-AF65-F5344CB8AC3E}">

</xml_diff>

<commit_message>
Update some diagrams used in UG/DG
</commit_message>
<xml_diff>
--- a/docs/diagrams/ModelComponentDashboardClassDiagram.pptx
+++ b/docs/diagrams/ModelComponentDashboardClassDiagram.pptx
@@ -5207,6 +5207,11 @@
             <a:prstGeom prst="line">
               <a:avLst/>
             </a:prstGeom>
+            <a:ln>
+              <a:solidFill>
+                <a:srgbClr val="7030A0"/>
+              </a:solidFill>
+            </a:ln>
           </p:spPr>
           <p:style>
             <a:lnRef idx="1">
@@ -5248,6 +5253,11 @@
           <a:prstGeom prst="line">
             <a:avLst/>
           </a:prstGeom>
+          <a:ln>
+            <a:solidFill>
+              <a:srgbClr val="7030A0"/>
+            </a:solidFill>
+          </a:ln>
         </p:spPr>
         <p:style>
           <a:lnRef idx="1">

</xml_diff>